<commit_message>
Update [개요] 노션 및 Github_210430.pptx
</commit_message>
<xml_diff>
--- a/210504_수료증명서+자격증+ppt/프로젝트+ppt/1_PPT_노션(개발블로그)과 Git설명_210430/[개요] 노션 및 Github_210430.pptx
+++ b/210504_수료증명서+자격증+ppt/프로젝트+ppt/1_PPT_노션(개발블로그)과 Git설명_210430/[개요] 노션 및 Github_210430.pptx
@@ -304,7 +304,7 @@
           <a:p>
             <a:fld id="{F8166F1F-CE9B-4651-A6AA-CD717754106B}" type="datetimeFigureOut">
               <a:rPr lang="en-US" smtClean="0"/>
-              <a:t>4/30/2021</a:t>
+              <a:t>9/23/2021</a:t>
             </a:fld>
             <a:endParaRPr lang="en-US"/>
           </a:p>
@@ -811,7 +811,7 @@
           <a:p>
             <a:fld id="{A76116CE-C4A3-4A05-B2D7-7C2E9A889C0F}" type="datetimeFigureOut">
               <a:rPr lang="en-US" smtClean="0"/>
-              <a:t>4/30/2021</a:t>
+              <a:t>9/23/2021</a:t>
             </a:fld>
             <a:endParaRPr lang="en-US"/>
           </a:p>
@@ -1052,7 +1052,7 @@
           <a:p>
             <a:fld id="{A76116CE-C4A3-4A05-B2D7-7C2E9A889C0F}" type="datetimeFigureOut">
               <a:rPr lang="en-US" smtClean="0"/>
-              <a:t>4/30/2021</a:t>
+              <a:t>9/23/2021</a:t>
             </a:fld>
             <a:endParaRPr lang="en-US"/>
           </a:p>
@@ -3116,8 +3116,8 @@
         </p:blipFill>
         <p:spPr>
           <a:xfrm>
-            <a:off x="1890429" y="849342"/>
-            <a:ext cx="12107755" cy="8963163"/>
+            <a:off x="14733370" y="3787189"/>
+            <a:ext cx="1115061" cy="1115061"/>
           </a:xfrm>
           <a:prstGeom prst="rect">
             <a:avLst/>
@@ -3140,8 +3140,8 @@
         </p:blipFill>
         <p:spPr>
           <a:xfrm>
-            <a:off x="10375066" y="6750609"/>
-            <a:ext cx="2276542" cy="1628828"/>
+            <a:off x="1890429" y="849342"/>
+            <a:ext cx="11949468" cy="8963163"/>
           </a:xfrm>
           <a:prstGeom prst="rect">
             <a:avLst/>
@@ -3164,140 +3164,110 @@
         </p:blipFill>
         <p:spPr>
           <a:xfrm>
-            <a:off x="14633140" y="7628267"/>
-            <a:ext cx="1388459" cy="661363"/>
+            <a:off x="10375066" y="6750609"/>
+            <a:ext cx="2189257" cy="1628828"/>
           </a:xfrm>
           <a:prstGeom prst="rect">
             <a:avLst/>
           </a:prstGeom>
         </p:spPr>
       </p:pic>
-      <p:grpSp>
-        <p:nvGrpSpPr>
-          <p:cNvPr id="1002" name="그룹 1002"/>
-          <p:cNvGrpSpPr/>
-          <p:nvPr/>
-        </p:nvGrpSpPr>
-        <p:grpSpPr>
-          <a:xfrm>
-            <a:off x="14661594" y="3061514"/>
-            <a:ext cx="1258613" cy="1840736"/>
-            <a:chOff x="14661594" y="3061514"/>
-            <a:chExt cx="1258613" cy="1840736"/>
-          </a:xfrm>
-        </p:grpSpPr>
-        <p:pic>
-          <p:nvPicPr>
-            <p:cNvPr id="9" name="Object 8"/>
-            <p:cNvPicPr>
-              <a:picLocks noChangeAspect="1"/>
-            </p:cNvPicPr>
-            <p:nvPr/>
-          </p:nvPicPr>
-          <p:blipFill>
-            <a:blip r:embed="rId6" cstate="print"/>
-            <a:stretch>
-              <a:fillRect/>
-            </a:stretch>
-          </p:blipFill>
-          <p:spPr>
-            <a:xfrm>
-              <a:off x="14733370" y="3787189"/>
-              <a:ext cx="1115061" cy="1115061"/>
-            </a:xfrm>
-            <a:prstGeom prst="rect">
-              <a:avLst/>
-            </a:prstGeom>
-          </p:spPr>
-        </p:pic>
-        <p:pic>
-          <p:nvPicPr>
-            <p:cNvPr id="10" name="Object 9"/>
-            <p:cNvPicPr>
-              <a:picLocks noChangeAspect="1"/>
-            </p:cNvPicPr>
-            <p:nvPr/>
-          </p:nvPicPr>
-          <p:blipFill>
-            <a:blip r:embed="rId7" cstate="print"/>
-            <a:stretch>
-              <a:fillRect/>
-            </a:stretch>
-          </p:blipFill>
-          <p:spPr>
-            <a:xfrm>
-              <a:off x="14604042" y="3003962"/>
-              <a:ext cx="1262388" cy="773422"/>
-            </a:xfrm>
-            <a:prstGeom prst="rect">
-              <a:avLst/>
-            </a:prstGeom>
-          </p:spPr>
-        </p:pic>
-      </p:grpSp>
-      <p:grpSp>
-        <p:nvGrpSpPr>
-          <p:cNvPr id="1003" name="그룹 1003"/>
-          <p:cNvGrpSpPr/>
-          <p:nvPr/>
-        </p:nvGrpSpPr>
-        <p:grpSpPr>
-          <a:xfrm>
-            <a:off x="14661594" y="5298958"/>
-            <a:ext cx="1258613" cy="1877886"/>
-            <a:chOff x="14661594" y="5298958"/>
-            <a:chExt cx="1258613" cy="1877886"/>
-          </a:xfrm>
-        </p:grpSpPr>
-        <p:pic>
-          <p:nvPicPr>
-            <p:cNvPr id="13" name="Object 12"/>
-            <p:cNvPicPr>
-              <a:picLocks noChangeAspect="1"/>
-            </p:cNvPicPr>
-            <p:nvPr/>
-          </p:nvPicPr>
-          <p:blipFill>
-            <a:blip r:embed="rId8" cstate="print"/>
-            <a:stretch>
-              <a:fillRect/>
-            </a:stretch>
-          </p:blipFill>
-          <p:spPr>
-            <a:xfrm>
-              <a:off x="14735967" y="6066979"/>
-              <a:ext cx="1109865" cy="1109865"/>
-            </a:xfrm>
-            <a:prstGeom prst="rect">
-              <a:avLst/>
-            </a:prstGeom>
-          </p:spPr>
-        </p:pic>
-        <p:pic>
-          <p:nvPicPr>
-            <p:cNvPr id="14" name="Object 13"/>
-            <p:cNvPicPr>
-              <a:picLocks noChangeAspect="1"/>
-            </p:cNvPicPr>
-            <p:nvPr/>
-          </p:nvPicPr>
-          <p:blipFill>
-            <a:blip r:embed="rId9" cstate="print"/>
-            <a:stretch>
-              <a:fillRect/>
-            </a:stretch>
-          </p:blipFill>
-          <p:spPr>
-            <a:xfrm>
-              <a:off x="14604042" y="5241407"/>
-              <a:ext cx="1465817" cy="794593"/>
-            </a:xfrm>
-            <a:prstGeom prst="rect">
-              <a:avLst/>
-            </a:prstGeom>
-          </p:spPr>
-        </p:pic>
-      </p:grpSp>
+      <p:pic>
+        <p:nvPicPr>
+          <p:cNvPr id="8" name="Object 7"/>
+          <p:cNvPicPr>
+            <a:picLocks noChangeAspect="1"/>
+          </p:cNvPicPr>
+          <p:nvPr/>
+        </p:nvPicPr>
+        <p:blipFill>
+          <a:blip r:embed="rId6" cstate="print"/>
+          <a:stretch>
+            <a:fillRect/>
+          </a:stretch>
+        </p:blipFill>
+        <p:spPr>
+          <a:xfrm>
+            <a:off x="14633140" y="7628267"/>
+            <a:ext cx="1340931" cy="806312"/>
+          </a:xfrm>
+          <a:prstGeom prst="rect">
+            <a:avLst/>
+          </a:prstGeom>
+        </p:spPr>
+      </p:pic>
+      <p:pic>
+        <p:nvPicPr>
+          <p:cNvPr id="9" name="Object 8"/>
+          <p:cNvPicPr>
+            <a:picLocks noChangeAspect="1"/>
+          </p:cNvPicPr>
+          <p:nvPr/>
+        </p:nvPicPr>
+        <p:blipFill>
+          <a:blip r:embed="rId7" cstate="print"/>
+          <a:stretch>
+            <a:fillRect/>
+          </a:stretch>
+        </p:blipFill>
+        <p:spPr>
+          <a:xfrm>
+            <a:off x="14604042" y="3003962"/>
+            <a:ext cx="1221966" cy="849102"/>
+          </a:xfrm>
+          <a:prstGeom prst="rect">
+            <a:avLst/>
+          </a:prstGeom>
+        </p:spPr>
+      </p:pic>
+      <p:pic>
+        <p:nvPicPr>
+          <p:cNvPr id="10" name="Object 9"/>
+          <p:cNvPicPr>
+            <a:picLocks noChangeAspect="1"/>
+          </p:cNvPicPr>
+          <p:nvPr/>
+        </p:nvPicPr>
+        <p:blipFill>
+          <a:blip r:embed="rId8" cstate="print"/>
+          <a:stretch>
+            <a:fillRect/>
+          </a:stretch>
+        </p:blipFill>
+        <p:spPr>
+          <a:xfrm>
+            <a:off x="14735967" y="6066979"/>
+            <a:ext cx="1109865" cy="1109865"/>
+          </a:xfrm>
+          <a:prstGeom prst="rect">
+            <a:avLst/>
+          </a:prstGeom>
+        </p:spPr>
+      </p:pic>
+      <p:pic>
+        <p:nvPicPr>
+          <p:cNvPr id="11" name="Object 10"/>
+          <p:cNvPicPr>
+            <a:picLocks noChangeAspect="1"/>
+          </p:cNvPicPr>
+          <p:nvPr/>
+        </p:nvPicPr>
+        <p:blipFill>
+          <a:blip r:embed="rId9" cstate="print"/>
+          <a:stretch>
+            <a:fillRect/>
+          </a:stretch>
+        </p:blipFill>
+        <p:spPr>
+          <a:xfrm>
+            <a:off x="14604042" y="5241407"/>
+            <a:ext cx="1431533" cy="870274"/>
+          </a:xfrm>
+          <a:prstGeom prst="rect">
+            <a:avLst/>
+          </a:prstGeom>
+        </p:spPr>
+      </p:pic>
     </p:spTree>
   </p:cSld>
   <p:clrMapOvr>
@@ -3465,7 +3435,7 @@
         <p:spPr>
           <a:xfrm>
             <a:off x="2095524" y="6055601"/>
-            <a:ext cx="5113996" cy="2297327"/>
+            <a:ext cx="5088631" cy="2297327"/>
           </a:xfrm>
           <a:prstGeom prst="rect">
             <a:avLst/>
@@ -3566,7 +3536,7 @@
           <p:spPr>
             <a:xfrm>
               <a:off x="10400458" y="5296917"/>
-              <a:ext cx="258154" cy="361055"/>
+              <a:ext cx="258154" cy="430257"/>
             </a:xfrm>
             <a:prstGeom prst="rect">
               <a:avLst/>
@@ -3644,7 +3614,7 @@
           <p:spPr>
             <a:xfrm>
               <a:off x="10400438" y="6015457"/>
-              <a:ext cx="246319" cy="361054"/>
+              <a:ext cx="246319" cy="430256"/>
             </a:xfrm>
             <a:prstGeom prst="rect">
               <a:avLst/>
@@ -3722,7 +3692,7 @@
           <p:spPr>
             <a:xfrm>
               <a:off x="10381425" y="6762574"/>
-              <a:ext cx="260605" cy="361054"/>
+              <a:ext cx="260605" cy="430256"/>
             </a:xfrm>
             <a:prstGeom prst="rect">
               <a:avLst/>
@@ -3858,7 +3828,7 @@
         <p:spPr>
           <a:xfrm>
             <a:off x="2095525" y="6055601"/>
-            <a:ext cx="3203164" cy="1921971"/>
+            <a:ext cx="3171165" cy="1921971"/>
           </a:xfrm>
           <a:prstGeom prst="rect">
             <a:avLst/>
@@ -4017,7 +3987,7 @@
         <p:spPr>
           <a:xfrm>
             <a:off x="2275328" y="2235253"/>
-            <a:ext cx="14079887" cy="4467497"/>
+            <a:ext cx="13777146" cy="5446624"/>
           </a:xfrm>
           <a:prstGeom prst="rect">
             <a:avLst/>
@@ -4041,7 +4011,7 @@
         <p:spPr>
           <a:xfrm>
             <a:off x="4421297" y="6923049"/>
-            <a:ext cx="5870971" cy="708552"/>
+            <a:ext cx="5846820" cy="863843"/>
           </a:xfrm>
           <a:prstGeom prst="rect">
             <a:avLst/>
@@ -4254,7 +4224,7 @@
         <p:spPr>
           <a:xfrm>
             <a:off x="1884755" y="6572813"/>
-            <a:ext cx="4521037" cy="1338645"/>
+            <a:ext cx="4459235" cy="1338645"/>
           </a:xfrm>
           <a:prstGeom prst="rect">
             <a:avLst/>
@@ -4278,7 +4248,7 @@
         <p:spPr>
           <a:xfrm>
             <a:off x="1876192" y="2194759"/>
-            <a:ext cx="2437018" cy="685697"/>
+            <a:ext cx="2353846" cy="835979"/>
           </a:xfrm>
           <a:prstGeom prst="rect">
             <a:avLst/>
@@ -4341,7 +4311,7 @@
         <p:spPr>
           <a:xfrm>
             <a:off x="11484880" y="1803070"/>
-            <a:ext cx="2103518" cy="2302943"/>
+            <a:ext cx="2103518" cy="2807672"/>
           </a:xfrm>
           <a:prstGeom prst="rect">
             <a:avLst/>
@@ -4403,8 +4373,8 @@
         </p:blipFill>
         <p:spPr>
           <a:xfrm>
-            <a:off x="1645719" y="2660848"/>
-            <a:ext cx="6735984" cy="3941166"/>
+            <a:off x="1645719" y="2702195"/>
+            <a:ext cx="6692810" cy="3939567"/>
           </a:xfrm>
           <a:prstGeom prst="rect">
             <a:avLst/>
@@ -4578,7 +4548,7 @@
         <p:spPr>
           <a:xfrm>
             <a:off x="1365094" y="5566722"/>
-            <a:ext cx="2800448" cy="810526"/>
+            <a:ext cx="2723224" cy="862051"/>
           </a:xfrm>
           <a:prstGeom prst="rect">
             <a:avLst/>
@@ -4602,7 +4572,7 @@
         <p:spPr>
           <a:xfrm>
             <a:off x="1377738" y="6224157"/>
-            <a:ext cx="3741401" cy="652232"/>
+            <a:ext cx="3684167" cy="693452"/>
           </a:xfrm>
           <a:prstGeom prst="rect">
             <a:avLst/>
@@ -4665,7 +4635,7 @@
         <p:spPr>
           <a:xfrm>
             <a:off x="1640763" y="7576191"/>
-            <a:ext cx="3952293" cy="944776"/>
+            <a:ext cx="3899570" cy="944776"/>
           </a:xfrm>
           <a:prstGeom prst="rect">
             <a:avLst/>
@@ -4728,7 +4698,7 @@
         <p:spPr>
           <a:xfrm>
             <a:off x="6860332" y="5566722"/>
-            <a:ext cx="2744814" cy="810526"/>
+            <a:ext cx="2723224" cy="862051"/>
           </a:xfrm>
           <a:prstGeom prst="rect">
             <a:avLst/>
@@ -4752,7 +4722,7 @@
         <p:spPr>
           <a:xfrm>
             <a:off x="6872976" y="6269470"/>
-            <a:ext cx="3885328" cy="662384"/>
+            <a:ext cx="3828094" cy="689359"/>
           </a:xfrm>
           <a:prstGeom prst="rect">
             <a:avLst/>
@@ -4815,7 +4785,7 @@
         <p:spPr>
           <a:xfrm>
             <a:off x="7136001" y="7576191"/>
-            <a:ext cx="3821191" cy="944776"/>
+            <a:ext cx="3777116" cy="944776"/>
           </a:xfrm>
           <a:prstGeom prst="rect">
             <a:avLst/>
@@ -4839,7 +4809,7 @@
         <p:spPr>
           <a:xfrm>
             <a:off x="12355541" y="5566722"/>
-            <a:ext cx="2733857" cy="814840"/>
+            <a:ext cx="2723225" cy="866365"/>
           </a:xfrm>
           <a:prstGeom prst="rect">
             <a:avLst/>
@@ -4863,7 +4833,7 @@
         <p:spPr>
           <a:xfrm>
             <a:off x="12368185" y="6224157"/>
-            <a:ext cx="3586675" cy="652232"/>
+            <a:ext cx="3551695" cy="693452"/>
           </a:xfrm>
           <a:prstGeom prst="rect">
             <a:avLst/>
@@ -5319,7 +5289,7 @@
         <p:spPr>
           <a:xfrm>
             <a:off x="2074418" y="3855237"/>
-            <a:ext cx="3054151" cy="1969224"/>
+            <a:ext cx="2987926" cy="1969224"/>
           </a:xfrm>
           <a:prstGeom prst="rect">
             <a:avLst/>
@@ -5493,7 +5463,7 @@
         <p:spPr>
           <a:xfrm>
             <a:off x="2095524" y="6055601"/>
-            <a:ext cx="5213374" cy="2297327"/>
+            <a:ext cx="5183852" cy="2297327"/>
           </a:xfrm>
           <a:prstGeom prst="rect">
             <a:avLst/>
@@ -5517,7 +5487,7 @@
         <p:spPr>
           <a:xfrm>
             <a:off x="2074418" y="3852456"/>
-            <a:ext cx="3054151" cy="1969224"/>
+            <a:ext cx="2987926" cy="1969224"/>
           </a:xfrm>
           <a:prstGeom prst="rect">
             <a:avLst/>
@@ -5633,7 +5603,7 @@
           <p:spPr>
             <a:xfrm>
               <a:off x="9758659" y="4135438"/>
-              <a:ext cx="258154" cy="361055"/>
+              <a:ext cx="258154" cy="430257"/>
             </a:xfrm>
             <a:prstGeom prst="rect">
               <a:avLst/>
@@ -5711,7 +5681,7 @@
           <p:spPr>
             <a:xfrm>
               <a:off x="9758639" y="5739550"/>
-              <a:ext cx="246319" cy="361054"/>
+              <a:ext cx="246319" cy="430256"/>
             </a:xfrm>
             <a:prstGeom prst="rect">
               <a:avLst/>
@@ -5789,7 +5759,7 @@
           <p:spPr>
             <a:xfrm>
               <a:off x="9739626" y="7166036"/>
-              <a:ext cx="260605" cy="361054"/>
+              <a:ext cx="260605" cy="430256"/>
             </a:xfrm>
             <a:prstGeom prst="rect">
               <a:avLst/>
@@ -5925,7 +5895,7 @@
         <p:spPr>
           <a:xfrm>
             <a:off x="2095524" y="6055601"/>
-            <a:ext cx="4650789" cy="1594615"/>
+            <a:ext cx="4621267" cy="1594615"/>
           </a:xfrm>
           <a:prstGeom prst="rect">
             <a:avLst/>
@@ -5949,7 +5919,7 @@
         <p:spPr>
           <a:xfrm>
             <a:off x="2074418" y="3852456"/>
-            <a:ext cx="3054151" cy="1969224"/>
+            <a:ext cx="2987926" cy="1969224"/>
           </a:xfrm>
           <a:prstGeom prst="rect">
             <a:avLst/>
@@ -6137,7 +6107,7 @@
           <p:spPr>
             <a:xfrm>
               <a:off x="2074422" y="3849675"/>
-              <a:ext cx="3451503" cy="1969224"/>
+              <a:ext cx="3360234" cy="1969224"/>
             </a:xfrm>
             <a:prstGeom prst="rect">
               <a:avLst/>
@@ -6162,7 +6132,7 @@
         <p:spPr>
           <a:xfrm>
             <a:off x="2095524" y="6055598"/>
-            <a:ext cx="5213370" cy="1594613"/>
+            <a:ext cx="5183848" cy="1594613"/>
           </a:xfrm>
           <a:prstGeom prst="rect">
             <a:avLst/>
@@ -6350,7 +6320,7 @@
           <p:spPr>
             <a:xfrm>
               <a:off x="2074422" y="3849675"/>
-              <a:ext cx="3451503" cy="1969224"/>
+              <a:ext cx="3360234" cy="1969224"/>
             </a:xfrm>
             <a:prstGeom prst="rect">
               <a:avLst/>
@@ -6375,7 +6345,7 @@
         <p:spPr>
           <a:xfrm>
             <a:off x="2095524" y="5994839"/>
-            <a:ext cx="4904842" cy="2002349"/>
+            <a:ext cx="4855361" cy="2002349"/>
           </a:xfrm>
           <a:prstGeom prst="rect">
             <a:avLst/>
@@ -6602,8 +6572,8 @@
         </p:blipFill>
         <p:spPr>
           <a:xfrm>
-            <a:off x="8216100" y="2721238"/>
-            <a:ext cx="5542973" cy="3922118"/>
+            <a:off x="8216100" y="2743538"/>
+            <a:ext cx="5455914" cy="3958614"/>
           </a:xfrm>
           <a:prstGeom prst="rect">
             <a:avLst/>
@@ -6627,7 +6597,7 @@
         <p:spPr>
           <a:xfrm>
             <a:off x="8458001" y="6575677"/>
-            <a:ext cx="5672493" cy="1259702"/>
+            <a:ext cx="5602196" cy="1259702"/>
           </a:xfrm>
           <a:prstGeom prst="rect">
             <a:avLst/>
@@ -6651,7 +6621,7 @@
         <p:spPr>
           <a:xfrm>
             <a:off x="8446575" y="2194759"/>
-            <a:ext cx="2388258" cy="685697"/>
+            <a:ext cx="2353846" cy="835979"/>
           </a:xfrm>
           <a:prstGeom prst="rect">
             <a:avLst/>
@@ -6714,7 +6684,7 @@
         <p:spPr>
           <a:xfrm>
             <a:off x="5345123" y="1869737"/>
-            <a:ext cx="2021636" cy="2302943"/>
+            <a:ext cx="2021636" cy="2807672"/>
           </a:xfrm>
           <a:prstGeom prst="rect">
             <a:avLst/>

</xml_diff>